<commit_message>
notes and homework progress
</commit_message>
<xml_diff>
--- a/Week 7 -- spatiotemporal models/Lab/Lab 7 -- spatial-Gompertz model.pptx
+++ b/Week 7 -- spatiotemporal models/Lab/Lab 7 -- spatial-Gompertz model.pptx
@@ -478,6 +478,359 @@
     </a:lvl9pPr>
   </p:notesStyle>
 </p:notesMaster>
+</file>
+
+<file path=ppt/notesSlides/notesSlide1.xml><?xml version="1.0" encoding="utf-8"?>
+<p:notes xmlns:a="http://schemas.openxmlformats.org/drawingml/2006/main" xmlns:r="http://schemas.openxmlformats.org/officeDocument/2006/relationships" xmlns:p="http://schemas.openxmlformats.org/presentationml/2006/main">
+  <p:cSld>
+    <p:spTree>
+      <p:nvGrpSpPr>
+        <p:cNvPr id="1" name=""/>
+        <p:cNvGrpSpPr/>
+        <p:nvPr/>
+      </p:nvGrpSpPr>
+      <p:grpSpPr>
+        <a:xfrm>
+          <a:off x="0" y="0"/>
+          <a:ext cx="0" cy="0"/>
+          <a:chOff x="0" y="0"/>
+          <a:chExt cx="0" cy="0"/>
+        </a:xfrm>
+      </p:grpSpPr>
+      <p:sp>
+        <p:nvSpPr>
+          <p:cNvPr id="2" name="Slide Image Placeholder 1"/>
+          <p:cNvSpPr>
+            <a:spLocks noGrp="1" noRot="1" noChangeAspect="1"/>
+          </p:cNvSpPr>
+          <p:nvPr>
+            <p:ph type="sldImg"/>
+          </p:nvPr>
+        </p:nvSpPr>
+        <p:spPr/>
+      </p:sp>
+      <p:sp>
+        <p:nvSpPr>
+          <p:cNvPr id="3" name="Notes Placeholder 2"/>
+          <p:cNvSpPr>
+            <a:spLocks noGrp="1"/>
+          </p:cNvSpPr>
+          <p:nvPr>
+            <p:ph type="body" idx="1"/>
+          </p:nvPr>
+        </p:nvSpPr>
+        <p:spPr/>
+        <p:txBody>
+          <a:bodyPr/>
+          <a:lstStyle/>
+          <a:p>
+            <a:r>
+              <a:rPr lang="en-US" dirty="0" smtClean="0"/>
+              <a:t>Match up conceptual parameters</a:t>
+            </a:r>
+            <a:r>
+              <a:rPr lang="en-US" baseline="0" dirty="0" smtClean="0"/>
+              <a:t> to parameters we’re estimating</a:t>
+            </a:r>
+          </a:p>
+          <a:p>
+            <a:endParaRPr lang="en-US" baseline="0" dirty="0" smtClean="0"/>
+          </a:p>
+          <a:p>
+            <a:r>
+              <a:rPr lang="en-US" baseline="0" dirty="0" err="1" smtClean="0"/>
+              <a:t>Kroencker</a:t>
+            </a:r>
+            <a:r>
+              <a:rPr lang="en-US" baseline="0" dirty="0" smtClean="0"/>
+              <a:t> product – spatial variance * time variance</a:t>
+            </a:r>
+          </a:p>
+          <a:p>
+            <a:r>
+              <a:rPr lang="en-US" baseline="0" dirty="0" smtClean="0"/>
+              <a:t>C is correlation matrix with unit variance</a:t>
+            </a:r>
+          </a:p>
+          <a:p>
+            <a:r>
+              <a:rPr lang="en-US" baseline="0" dirty="0" smtClean="0"/>
+              <a:t>“decorrelation distance” </a:t>
+            </a:r>
+            <a:r>
+              <a:rPr lang="en-US" baseline="0" dirty="0" smtClean="0">
+                <a:sym typeface="Wingdings" panose="05000000000000000000" pitchFamily="2" charset="2"/>
+              </a:rPr>
+              <a:t> range parameter</a:t>
+            </a:r>
+          </a:p>
+          <a:p>
+            <a:endParaRPr lang="en-US" baseline="0" dirty="0" smtClean="0">
+              <a:sym typeface="Wingdings" panose="05000000000000000000" pitchFamily="2" charset="2"/>
+            </a:endParaRPr>
+          </a:p>
+          <a:p>
+            <a:r>
+              <a:rPr lang="en-US" baseline="0" dirty="0" smtClean="0">
+                <a:sym typeface="Wingdings" panose="05000000000000000000" pitchFamily="2" charset="2"/>
+              </a:rPr>
+              <a:t>C(omega) has different kappa value from C(epsilon) ---- for teaching purposes, using same kappa</a:t>
+            </a:r>
+          </a:p>
+          <a:p>
+            <a:r>
+              <a:rPr lang="en-US" baseline="0" dirty="0" smtClean="0">
+                <a:sym typeface="Wingdings" panose="05000000000000000000" pitchFamily="2" charset="2"/>
+              </a:rPr>
+              <a:t>Jointly model process error </a:t>
+            </a:r>
+          </a:p>
+        </p:txBody>
+      </p:sp>
+      <p:sp>
+        <p:nvSpPr>
+          <p:cNvPr id="4" name="Slide Number Placeholder 3"/>
+          <p:cNvSpPr>
+            <a:spLocks noGrp="1"/>
+          </p:cNvSpPr>
+          <p:nvPr>
+            <p:ph type="sldNum" sz="quarter" idx="10"/>
+          </p:nvPr>
+        </p:nvSpPr>
+        <p:spPr/>
+        <p:txBody>
+          <a:bodyPr/>
+          <a:lstStyle/>
+          <a:p>
+            <a:fld id="{DCDC1745-AA19-4253-83E6-9EAE9D7EFFC9}" type="slidenum">
+              <a:rPr lang="en-US" smtClean="0"/>
+              <a:t>8</a:t>
+            </a:fld>
+            <a:endParaRPr lang="en-US"/>
+          </a:p>
+        </p:txBody>
+      </p:sp>
+    </p:spTree>
+    <p:extLst>
+      <p:ext uri="{BB962C8B-B14F-4D97-AF65-F5344CB8AC3E}">
+        <p14:creationId xmlns:p14="http://schemas.microsoft.com/office/powerpoint/2010/main" val="2471343049"/>
+      </p:ext>
+    </p:extLst>
+  </p:cSld>
+  <p:clrMapOvr>
+    <a:masterClrMapping/>
+  </p:clrMapOvr>
+</p:notes>
+</file>
+
+<file path=ppt/notesSlides/notesSlide2.xml><?xml version="1.0" encoding="utf-8"?>
+<p:notes xmlns:a="http://schemas.openxmlformats.org/drawingml/2006/main" xmlns:r="http://schemas.openxmlformats.org/officeDocument/2006/relationships" xmlns:p="http://schemas.openxmlformats.org/presentationml/2006/main">
+  <p:cSld>
+    <p:spTree>
+      <p:nvGrpSpPr>
+        <p:cNvPr id="1" name=""/>
+        <p:cNvGrpSpPr/>
+        <p:nvPr/>
+      </p:nvGrpSpPr>
+      <p:grpSpPr>
+        <a:xfrm>
+          <a:off x="0" y="0"/>
+          <a:ext cx="0" cy="0"/>
+          <a:chOff x="0" y="0"/>
+          <a:chExt cx="0" cy="0"/>
+        </a:xfrm>
+      </p:grpSpPr>
+      <p:sp>
+        <p:nvSpPr>
+          <p:cNvPr id="2" name="Slide Image Placeholder 1"/>
+          <p:cNvSpPr>
+            <a:spLocks noGrp="1" noRot="1" noChangeAspect="1"/>
+          </p:cNvSpPr>
+          <p:nvPr>
+            <p:ph type="sldImg"/>
+          </p:nvPr>
+        </p:nvSpPr>
+        <p:spPr/>
+      </p:sp>
+      <p:sp>
+        <p:nvSpPr>
+          <p:cNvPr id="3" name="Notes Placeholder 2"/>
+          <p:cNvSpPr>
+            <a:spLocks noGrp="1"/>
+          </p:cNvSpPr>
+          <p:nvPr>
+            <p:ph type="body" idx="1"/>
+          </p:nvPr>
+        </p:nvSpPr>
+        <p:spPr/>
+        <p:txBody>
+          <a:bodyPr/>
+          <a:lstStyle/>
+          <a:p>
+            <a:r>
+              <a:rPr lang="en-US" dirty="0" smtClean="0"/>
+              <a:t>Model epsilon</a:t>
+            </a:r>
+            <a:r>
+              <a:rPr lang="en-US" baseline="0" dirty="0" smtClean="0"/>
+              <a:t> vs. density as being random</a:t>
+            </a:r>
+          </a:p>
+          <a:p>
+            <a:r>
+              <a:rPr lang="en-US" baseline="0" dirty="0" smtClean="0"/>
+              <a:t>Third parameterization would be joint process errors</a:t>
+            </a:r>
+            <a:endParaRPr lang="en-US" dirty="0"/>
+          </a:p>
+        </p:txBody>
+      </p:sp>
+      <p:sp>
+        <p:nvSpPr>
+          <p:cNvPr id="4" name="Slide Number Placeholder 3"/>
+          <p:cNvSpPr>
+            <a:spLocks noGrp="1"/>
+          </p:cNvSpPr>
+          <p:nvPr>
+            <p:ph type="sldNum" sz="quarter" idx="10"/>
+          </p:nvPr>
+        </p:nvSpPr>
+        <p:spPr/>
+        <p:txBody>
+          <a:bodyPr/>
+          <a:lstStyle/>
+          <a:p>
+            <a:fld id="{DCDC1745-AA19-4253-83E6-9EAE9D7EFFC9}" type="slidenum">
+              <a:rPr lang="en-US" smtClean="0"/>
+              <a:t>9</a:t>
+            </a:fld>
+            <a:endParaRPr lang="en-US"/>
+          </a:p>
+        </p:txBody>
+      </p:sp>
+    </p:spTree>
+    <p:extLst>
+      <p:ext uri="{BB962C8B-B14F-4D97-AF65-F5344CB8AC3E}">
+        <p14:creationId xmlns:p14="http://schemas.microsoft.com/office/powerpoint/2010/main" val="628118171"/>
+      </p:ext>
+    </p:extLst>
+  </p:cSld>
+  <p:clrMapOvr>
+    <a:masterClrMapping/>
+  </p:clrMapOvr>
+</p:notes>
+</file>
+
+<file path=ppt/notesSlides/notesSlide3.xml><?xml version="1.0" encoding="utf-8"?>
+<p:notes xmlns:a="http://schemas.openxmlformats.org/drawingml/2006/main" xmlns:r="http://schemas.openxmlformats.org/officeDocument/2006/relationships" xmlns:p="http://schemas.openxmlformats.org/presentationml/2006/main">
+  <p:cSld>
+    <p:spTree>
+      <p:nvGrpSpPr>
+        <p:cNvPr id="1" name=""/>
+        <p:cNvGrpSpPr/>
+        <p:nvPr/>
+      </p:nvGrpSpPr>
+      <p:grpSpPr>
+        <a:xfrm>
+          <a:off x="0" y="0"/>
+          <a:ext cx="0" cy="0"/>
+          <a:chOff x="0" y="0"/>
+          <a:chExt cx="0" cy="0"/>
+        </a:xfrm>
+      </p:grpSpPr>
+      <p:sp>
+        <p:nvSpPr>
+          <p:cNvPr id="2" name="Slide Image Placeholder 1"/>
+          <p:cNvSpPr>
+            <a:spLocks noGrp="1" noRot="1" noChangeAspect="1"/>
+          </p:cNvSpPr>
+          <p:nvPr>
+            <p:ph type="sldImg"/>
+          </p:nvPr>
+        </p:nvSpPr>
+        <p:spPr/>
+      </p:sp>
+      <p:sp>
+        <p:nvSpPr>
+          <p:cNvPr id="3" name="Notes Placeholder 2"/>
+          <p:cNvSpPr>
+            <a:spLocks noGrp="1"/>
+          </p:cNvSpPr>
+          <p:nvPr>
+            <p:ph type="body" idx="1"/>
+          </p:nvPr>
+        </p:nvSpPr>
+        <p:spPr/>
+        <p:txBody>
+          <a:bodyPr/>
+          <a:lstStyle/>
+          <a:p>
+            <a:r>
+              <a:rPr lang="en-US" dirty="0" smtClean="0"/>
+              <a:t>No temporal effect</a:t>
+            </a:r>
+          </a:p>
+          <a:p>
+            <a:r>
+              <a:rPr lang="en-US" dirty="0" smtClean="0"/>
+              <a:t>Yes spatial effect</a:t>
+            </a:r>
+          </a:p>
+          <a:p>
+            <a:r>
+              <a:rPr lang="en-US" dirty="0" smtClean="0"/>
+              <a:t>Yes</a:t>
+            </a:r>
+            <a:r>
+              <a:rPr lang="en-US" baseline="0" dirty="0" smtClean="0"/>
+              <a:t> </a:t>
+            </a:r>
+            <a:r>
+              <a:rPr lang="en-US" baseline="0" dirty="0" err="1" smtClean="0"/>
+              <a:t>spatio</a:t>
+            </a:r>
+            <a:r>
+              <a:rPr lang="en-US" baseline="0" dirty="0" smtClean="0"/>
+              <a:t>-temporal effect (smoothed)</a:t>
+            </a:r>
+            <a:endParaRPr lang="en-US" dirty="0"/>
+          </a:p>
+        </p:txBody>
+      </p:sp>
+      <p:sp>
+        <p:nvSpPr>
+          <p:cNvPr id="4" name="Slide Number Placeholder 3"/>
+          <p:cNvSpPr>
+            <a:spLocks noGrp="1"/>
+          </p:cNvSpPr>
+          <p:nvPr>
+            <p:ph type="sldNum" sz="quarter" idx="10"/>
+          </p:nvPr>
+        </p:nvSpPr>
+        <p:spPr/>
+        <p:txBody>
+          <a:bodyPr/>
+          <a:lstStyle/>
+          <a:p>
+            <a:fld id="{DCDC1745-AA19-4253-83E6-9EAE9D7EFFC9}" type="slidenum">
+              <a:rPr lang="en-US" smtClean="0"/>
+              <a:t>11</a:t>
+            </a:fld>
+            <a:endParaRPr lang="en-US"/>
+          </a:p>
+        </p:txBody>
+      </p:sp>
+    </p:spTree>
+    <p:extLst>
+      <p:ext uri="{BB962C8B-B14F-4D97-AF65-F5344CB8AC3E}">
+        <p14:creationId xmlns:p14="http://schemas.microsoft.com/office/powerpoint/2010/main" val="1519202164"/>
+      </p:ext>
+    </p:extLst>
+  </p:cSld>
+  <p:clrMapOvr>
+    <a:masterClrMapping/>
+  </p:clrMapOvr>
+</p:notes>
 </file>
 
 <file path=ppt/slideLayouts/slideLayout1.xml><?xml version="1.0" encoding="utf-8"?>
@@ -3570,8 +3923,8 @@
           </a:p>
         </p:txBody>
       </p:sp>
-      <mc:AlternateContent xmlns:mc="http://schemas.openxmlformats.org/markup-compatibility/2006">
-        <mc:Choice xmlns:a14="http://schemas.microsoft.com/office/drawing/2010/main" Requires="a14">
+      <mc:AlternateContent xmlns:mc="http://schemas.openxmlformats.org/markup-compatibility/2006" xmlns:a14="http://schemas.microsoft.com/office/drawing/2010/main">
+        <mc:Choice Requires="a14">
           <p:sp>
             <p:nvSpPr>
               <p:cNvPr id="3" name="Content Placeholder 2"/>
@@ -3592,11 +3945,7 @@
                 </a:pPr>
                 <a:r>
                   <a:rPr lang="en-US" dirty="0" smtClean="0"/>
-                  <a:t>REVIEW: Four </a:t>
-                </a:r>
-                <a:r>
-                  <a:rPr lang="en-US" dirty="0" smtClean="0"/>
-                  <a:t>ways to code </a:t>
+                  <a:t>REVIEW: Four ways to code </a:t>
                 </a:r>
               </a:p>
               <a:p>
@@ -4293,7 +4642,7 @@
             </p:txBody>
           </p:sp>
         </mc:Choice>
-        <mc:Fallback>
+        <mc:Fallback xmlns="">
           <p:sp>
             <p:nvSpPr>
               <p:cNvPr id="3" name="Content Placeholder 2"/>
@@ -4467,35 +4816,35 @@
                     <a:gridCol w="782725">
                       <a:extLst>
                         <a:ext uri="{9D8B030D-6E8A-4147-A177-3AD203B41FA5}">
-                          <a16:colId xmlns:a16="http://schemas.microsoft.com/office/drawing/2014/main" val="1044793742"/>
+                          <a16:colId xmlns:a16="http://schemas.microsoft.com/office/drawing/2014/main" xmlns="" val="1044793742"/>
                         </a:ext>
                       </a:extLst>
                     </a:gridCol>
                     <a:gridCol w="1455725">
                       <a:extLst>
                         <a:ext uri="{9D8B030D-6E8A-4147-A177-3AD203B41FA5}">
-                          <a16:colId xmlns:a16="http://schemas.microsoft.com/office/drawing/2014/main" val="1247232197"/>
+                          <a16:colId xmlns:a16="http://schemas.microsoft.com/office/drawing/2014/main" xmlns="" val="1247232197"/>
                         </a:ext>
                       </a:extLst>
                     </a:gridCol>
                     <a:gridCol w="2033626">
                       <a:extLst>
                         <a:ext uri="{9D8B030D-6E8A-4147-A177-3AD203B41FA5}">
-                          <a16:colId xmlns:a16="http://schemas.microsoft.com/office/drawing/2014/main" val="2025888858"/>
+                          <a16:colId xmlns:a16="http://schemas.microsoft.com/office/drawing/2014/main" xmlns="" val="2025888858"/>
                         </a:ext>
                       </a:extLst>
                     </a:gridCol>
                     <a:gridCol w="2099462">
                       <a:extLst>
                         <a:ext uri="{9D8B030D-6E8A-4147-A177-3AD203B41FA5}">
-                          <a16:colId xmlns:a16="http://schemas.microsoft.com/office/drawing/2014/main" val="2119540534"/>
+                          <a16:colId xmlns:a16="http://schemas.microsoft.com/office/drawing/2014/main" xmlns="" val="2119540534"/>
                         </a:ext>
                       </a:extLst>
                     </a:gridCol>
                     <a:gridCol w="2128722">
                       <a:extLst>
                         <a:ext uri="{9D8B030D-6E8A-4147-A177-3AD203B41FA5}">
-                          <a16:colId xmlns:a16="http://schemas.microsoft.com/office/drawing/2014/main" val="2262901501"/>
+                          <a16:colId xmlns:a16="http://schemas.microsoft.com/office/drawing/2014/main" xmlns="" val="2262901501"/>
                         </a:ext>
                       </a:extLst>
                     </a:gridCol>
@@ -4580,7 +4929,7 @@
                     </a:tc>
                     <a:extLst>
                       <a:ext uri="{0D108BD9-81ED-4DB2-BD59-A6C34878D82A}">
-                        <a16:rowId xmlns:a16="http://schemas.microsoft.com/office/drawing/2014/main" val="4149236068"/>
+                        <a16:rowId xmlns:a16="http://schemas.microsoft.com/office/drawing/2014/main" xmlns="" val="4149236068"/>
                       </a:ext>
                     </a:extLst>
                   </a:tr>
@@ -4716,7 +5065,7 @@
                     </a:tc>
                     <a:extLst>
                       <a:ext uri="{0D108BD9-81ED-4DB2-BD59-A6C34878D82A}">
-                        <a16:rowId xmlns:a16="http://schemas.microsoft.com/office/drawing/2014/main" val="3786578407"/>
+                        <a16:rowId xmlns:a16="http://schemas.microsoft.com/office/drawing/2014/main" xmlns="" val="3786578407"/>
                       </a:ext>
                     </a:extLst>
                   </a:tr>
@@ -5041,7 +5390,7 @@
                     </a:tc>
                     <a:extLst>
                       <a:ext uri="{0D108BD9-81ED-4DB2-BD59-A6C34878D82A}">
-                        <a16:rowId xmlns:a16="http://schemas.microsoft.com/office/drawing/2014/main" val="4250802862"/>
+                        <a16:rowId xmlns:a16="http://schemas.microsoft.com/office/drawing/2014/main" xmlns="" val="4250802862"/>
                       </a:ext>
                     </a:extLst>
                   </a:tr>
@@ -5626,7 +5975,7 @@
                     </a:tc>
                     <a:extLst>
                       <a:ext uri="{0D108BD9-81ED-4DB2-BD59-A6C34878D82A}">
-                        <a16:rowId xmlns:a16="http://schemas.microsoft.com/office/drawing/2014/main" val="493528068"/>
+                        <a16:rowId xmlns:a16="http://schemas.microsoft.com/office/drawing/2014/main" xmlns="" val="493528068"/>
                       </a:ext>
                     </a:extLst>
                   </a:tr>
@@ -6133,7 +6482,7 @@
                     </a:tc>
                     <a:extLst>
                       <a:ext uri="{0D108BD9-81ED-4DB2-BD59-A6C34878D82A}">
-                        <a16:rowId xmlns:a16="http://schemas.microsoft.com/office/drawing/2014/main" val="760499547"/>
+                        <a16:rowId xmlns:a16="http://schemas.microsoft.com/office/drawing/2014/main" xmlns="" val="760499547"/>
                       </a:ext>
                     </a:extLst>
                   </a:tr>
@@ -6471,7 +6820,7 @@
                       </a:txBody>
                       <a:tcPr>
                         <a:blipFill>
-                          <a:blip r:embed="rId2"/>
+                          <a:blip r:embed="rId3"/>
                           <a:stretch>
                             <a:fillRect l="-110479" t="-208197" r="-208982" b="-391803"/>
                           </a:stretch>
@@ -6488,7 +6837,7 @@
                       </a:txBody>
                       <a:tcPr>
                         <a:blipFill>
-                          <a:blip r:embed="rId2"/>
+                          <a:blip r:embed="rId3"/>
                           <a:stretch>
                             <a:fillRect l="-204360" t="-208197" r="-102907" b="-391803"/>
                           </a:stretch>
@@ -6505,7 +6854,7 @@
                       </a:txBody>
                       <a:tcPr>
                         <a:blipFill>
-                          <a:blip r:embed="rId2"/>
+                          <a:blip r:embed="rId3"/>
                           <a:stretch>
                             <a:fillRect l="-299143" t="-208197" r="-1143" b="-391803"/>
                           </a:stretch>
@@ -6565,7 +6914,7 @@
                       </a:txBody>
                       <a:tcPr>
                         <a:blipFill>
-                          <a:blip r:embed="rId2"/>
+                          <a:blip r:embed="rId3"/>
                           <a:stretch>
                             <a:fillRect l="-110479" t="-179048" r="-208982" b="-127619"/>
                           </a:stretch>
@@ -6582,7 +6931,7 @@
                       </a:txBody>
                       <a:tcPr>
                         <a:blipFill>
-                          <a:blip r:embed="rId2"/>
+                          <a:blip r:embed="rId3"/>
                           <a:stretch>
                             <a:fillRect l="-204360" t="-179048" r="-102907" b="-127619"/>
                           </a:stretch>
@@ -6599,7 +6948,7 @@
                       </a:txBody>
                       <a:tcPr>
                         <a:blipFill>
-                          <a:blip r:embed="rId2"/>
+                          <a:blip r:embed="rId3"/>
                           <a:stretch>
                             <a:fillRect l="-299143" t="-179048" r="-1143" b="-127619"/>
                           </a:stretch>
@@ -6659,7 +7008,7 @@
                       </a:txBody>
                       <a:tcPr>
                         <a:blipFill>
-                          <a:blip r:embed="rId2"/>
+                          <a:blip r:embed="rId3"/>
                           <a:stretch>
                             <a:fillRect l="-110479" t="-424638" r="-208982" b="-94203"/>
                           </a:stretch>
@@ -6676,7 +7025,7 @@
                       </a:txBody>
                       <a:tcPr>
                         <a:blipFill>
-                          <a:blip r:embed="rId2"/>
+                          <a:blip r:embed="rId3"/>
                           <a:stretch>
                             <a:fillRect l="-204360" t="-424638" r="-102907" b="-94203"/>
                           </a:stretch>
@@ -6693,7 +7042,7 @@
                       </a:txBody>
                       <a:tcPr>
                         <a:blipFill>
-                          <a:blip r:embed="rId2"/>
+                          <a:blip r:embed="rId3"/>
                           <a:stretch>
                             <a:fillRect l="-299143" t="-424638" r="-1143" b="-94203"/>
                           </a:stretch>
@@ -6738,35 +7087,35 @@
                     <a:gridCol w="782725">
                       <a:extLst>
                         <a:ext uri="{9D8B030D-6E8A-4147-A177-3AD203B41FA5}">
-                          <a16:colId xmlns:a16="http://schemas.microsoft.com/office/drawing/2014/main" val="1044793742"/>
+                          <a16:colId xmlns:a16="http://schemas.microsoft.com/office/drawing/2014/main" xmlns="" val="1044793742"/>
                         </a:ext>
                       </a:extLst>
                     </a:gridCol>
                     <a:gridCol w="1455725">
                       <a:extLst>
                         <a:ext uri="{9D8B030D-6E8A-4147-A177-3AD203B41FA5}">
-                          <a16:colId xmlns:a16="http://schemas.microsoft.com/office/drawing/2014/main" val="1247232197"/>
+                          <a16:colId xmlns:a16="http://schemas.microsoft.com/office/drawing/2014/main" xmlns="" val="1247232197"/>
                         </a:ext>
                       </a:extLst>
                     </a:gridCol>
                     <a:gridCol w="2033626">
                       <a:extLst>
                         <a:ext uri="{9D8B030D-6E8A-4147-A177-3AD203B41FA5}">
-                          <a16:colId xmlns:a16="http://schemas.microsoft.com/office/drawing/2014/main" val="2025888858"/>
+                          <a16:colId xmlns:a16="http://schemas.microsoft.com/office/drawing/2014/main" xmlns="" val="2025888858"/>
                         </a:ext>
                       </a:extLst>
                     </a:gridCol>
                     <a:gridCol w="2099462">
                       <a:extLst>
                         <a:ext uri="{9D8B030D-6E8A-4147-A177-3AD203B41FA5}">
-                          <a16:colId xmlns:a16="http://schemas.microsoft.com/office/drawing/2014/main" val="2119540534"/>
+                          <a16:colId xmlns:a16="http://schemas.microsoft.com/office/drawing/2014/main" xmlns="" val="2119540534"/>
                         </a:ext>
                       </a:extLst>
                     </a:gridCol>
                     <a:gridCol w="2128722">
                       <a:extLst>
                         <a:ext uri="{9D8B030D-6E8A-4147-A177-3AD203B41FA5}">
-                          <a16:colId xmlns:a16="http://schemas.microsoft.com/office/drawing/2014/main" val="2262901501"/>
+                          <a16:colId xmlns:a16="http://schemas.microsoft.com/office/drawing/2014/main" xmlns="" val="2262901501"/>
                         </a:ext>
                       </a:extLst>
                     </a:gridCol>
@@ -6851,7 +7200,7 @@
                     </a:tc>
                     <a:extLst>
                       <a:ext uri="{0D108BD9-81ED-4DB2-BD59-A6C34878D82A}">
-                        <a16:rowId xmlns:a16="http://schemas.microsoft.com/office/drawing/2014/main" val="4149236068"/>
+                        <a16:rowId xmlns:a16="http://schemas.microsoft.com/office/drawing/2014/main" xmlns="" val="4149236068"/>
                       </a:ext>
                     </a:extLst>
                   </a:tr>
@@ -6987,7 +7336,7 @@
                     </a:tc>
                     <a:extLst>
                       <a:ext uri="{0D108BD9-81ED-4DB2-BD59-A6C34878D82A}">
-                        <a16:rowId xmlns:a16="http://schemas.microsoft.com/office/drawing/2014/main" val="3786578407"/>
+                        <a16:rowId xmlns:a16="http://schemas.microsoft.com/office/drawing/2014/main" xmlns="" val="3786578407"/>
                       </a:ext>
                     </a:extLst>
                   </a:tr>
@@ -7438,7 +7787,7 @@
                     </a:tc>
                     <a:extLst>
                       <a:ext uri="{0D108BD9-81ED-4DB2-BD59-A6C34878D82A}">
-                        <a16:rowId xmlns:a16="http://schemas.microsoft.com/office/drawing/2014/main" val="4250802862"/>
+                        <a16:rowId xmlns:a16="http://schemas.microsoft.com/office/drawing/2014/main" xmlns="" val="4250802862"/>
                       </a:ext>
                     </a:extLst>
                   </a:tr>
@@ -8107,7 +8456,7 @@
                     </a:tc>
                     <a:extLst>
                       <a:ext uri="{0D108BD9-81ED-4DB2-BD59-A6C34878D82A}">
-                        <a16:rowId xmlns:a16="http://schemas.microsoft.com/office/drawing/2014/main" val="493528068"/>
+                        <a16:rowId xmlns:a16="http://schemas.microsoft.com/office/drawing/2014/main" xmlns="" val="493528068"/>
                       </a:ext>
                     </a:extLst>
                   </a:tr>
@@ -8740,7 +9089,7 @@
                     </a:tc>
                     <a:extLst>
                       <a:ext uri="{0D108BD9-81ED-4DB2-BD59-A6C34878D82A}">
-                        <a16:rowId xmlns:a16="http://schemas.microsoft.com/office/drawing/2014/main" val="760499547"/>
+                        <a16:rowId xmlns:a16="http://schemas.microsoft.com/office/drawing/2014/main" xmlns="" val="760499547"/>
                       </a:ext>
                     </a:extLst>
                   </a:tr>
@@ -9078,7 +9427,7 @@
                       </a:txBody>
                       <a:tcPr>
                         <a:blipFill>
-                          <a:blip r:embed="rId3"/>
+                          <a:blip r:embed="rId4"/>
                           <a:stretch>
                             <a:fillRect l="-110479" t="-164935" r="-208982" b="-310390"/>
                           </a:stretch>
@@ -9095,7 +9444,7 @@
                       </a:txBody>
                       <a:tcPr>
                         <a:blipFill>
-                          <a:blip r:embed="rId3"/>
+                          <a:blip r:embed="rId4"/>
                           <a:stretch>
                             <a:fillRect l="-204360" t="-164935" r="-102907" b="-310390"/>
                           </a:stretch>
@@ -9112,7 +9461,7 @@
                       </a:txBody>
                       <a:tcPr>
                         <a:blipFill>
-                          <a:blip r:embed="rId3"/>
+                          <a:blip r:embed="rId4"/>
                           <a:stretch>
                             <a:fillRect l="-299143" t="-164935" r="-1143" b="-310390"/>
                           </a:stretch>
@@ -9172,7 +9521,7 @@
                       </a:txBody>
                       <a:tcPr>
                         <a:blipFill>
-                          <a:blip r:embed="rId3"/>
+                          <a:blip r:embed="rId4"/>
                           <a:stretch>
                             <a:fillRect l="-110479" t="-194286" r="-208982" b="-127619"/>
                           </a:stretch>
@@ -9189,7 +9538,7 @@
                       </a:txBody>
                       <a:tcPr>
                         <a:blipFill>
-                          <a:blip r:embed="rId3"/>
+                          <a:blip r:embed="rId4"/>
                           <a:stretch>
                             <a:fillRect l="-204360" t="-194286" r="-102907" b="-127619"/>
                           </a:stretch>
@@ -9206,7 +9555,7 @@
                       </a:txBody>
                       <a:tcPr>
                         <a:blipFill>
-                          <a:blip r:embed="rId3"/>
+                          <a:blip r:embed="rId4"/>
                           <a:stretch>
                             <a:fillRect l="-299143" t="-194286" r="-1143" b="-127619"/>
                           </a:stretch>
@@ -9266,7 +9615,7 @@
                       </a:txBody>
                       <a:tcPr>
                         <a:blipFill>
-                          <a:blip r:embed="rId3"/>
+                          <a:blip r:embed="rId4"/>
                           <a:stretch>
                             <a:fillRect l="-110479" t="-447826" r="-208982" b="-94203"/>
                           </a:stretch>
@@ -9283,7 +9632,7 @@
                       </a:txBody>
                       <a:tcPr>
                         <a:blipFill>
-                          <a:blip r:embed="rId3"/>
+                          <a:blip r:embed="rId4"/>
                           <a:stretch>
                             <a:fillRect l="-204360" t="-447826" r="-102907" b="-94203"/>
                           </a:stretch>
@@ -9300,7 +9649,7 @@
                       </a:txBody>
                       <a:tcPr>
                         <a:blipFill>
-                          <a:blip r:embed="rId3"/>
+                          <a:blip r:embed="rId4"/>
                           <a:stretch>
                             <a:fillRect l="-299143" t="-447826" r="-1143" b="-94203"/>
                           </a:stretch>
@@ -13237,7 +13586,7 @@
           <a:graphicData uri="http://schemas.openxmlformats.org/presentationml/2006/ole">
             <mc:AlternateContent xmlns:mc="http://schemas.openxmlformats.org/markup-compatibility/2006">
               <mc:Choice xmlns:v="urn:schemas-microsoft-com:vml" Requires="v">
-                <p:oleObj spid="_x0000_s1036" name="Equation" r:id="rId4" imgW="2616120" imgH="1168200" progId="Equation.DSMT4">
+                <p:oleObj spid="_x0000_s1041" name="Equation" r:id="rId4" imgW="2616120" imgH="1168200" progId="Equation.DSMT4">
                   <p:embed/>
                 </p:oleObj>
               </mc:Choice>
@@ -13328,8 +13677,8 @@
           </a:p>
         </p:txBody>
       </p:sp>
-      <mc:AlternateContent xmlns:mc="http://schemas.openxmlformats.org/markup-compatibility/2006">
-        <mc:Choice xmlns:a14="http://schemas.microsoft.com/office/drawing/2010/main" Requires="a14">
+      <mc:AlternateContent xmlns:mc="http://schemas.openxmlformats.org/markup-compatibility/2006" xmlns:a14="http://schemas.microsoft.com/office/drawing/2010/main">
+        <mc:Choice Requires="a14">
           <p:sp>
             <p:nvSpPr>
               <p:cNvPr id="3" name="Content Placeholder 2"/>
@@ -13350,11 +13699,7 @@
                 </a:pPr>
                 <a:r>
                   <a:rPr lang="en-US" dirty="0" smtClean="0"/>
-                  <a:t>REVIEW: Four </a:t>
-                </a:r>
-                <a:r>
-                  <a:rPr lang="en-US" dirty="0" smtClean="0"/>
-                  <a:t>ways to code </a:t>
+                  <a:t>REVIEW: Four ways to code </a:t>
                 </a:r>
               </a:p>
               <a:p>
@@ -13914,7 +14259,7 @@
             </p:txBody>
           </p:sp>
         </mc:Choice>
-        <mc:Fallback>
+        <mc:Fallback xmlns="">
           <p:sp>
             <p:nvSpPr>
               <p:cNvPr id="3" name="Content Placeholder 2"/>
@@ -16050,7 +16395,7 @@
             </p:nvSpPr>
             <p:spPr>
               <a:blipFill>
-                <a:blip r:embed="rId2"/>
+                <a:blip r:embed="rId3"/>
                 <a:stretch>
                   <a:fillRect l="-746" t="-615"/>
                 </a:stretch>
@@ -16557,7 +16902,7 @@
                 <a:avLst/>
               </a:prstGeom>
               <a:blipFill>
-                <a:blip r:embed="rId3"/>
+                <a:blip r:embed="rId4"/>
                 <a:stretch>
                   <a:fillRect l="-1863"/>
                 </a:stretch>
@@ -18328,7 +18673,7 @@
             </p:nvSpPr>
             <p:spPr>
               <a:blipFill>
-                <a:blip r:embed="rId2"/>
+                <a:blip r:embed="rId3"/>
                 <a:stretch>
                   <a:fillRect l="-1085" t="-1436"/>
                 </a:stretch>

</xml_diff>